<commit_message>
started drafting 3MT presentation
</commit_message>
<xml_diff>
--- a/reference/presentations/SWPACA-Lawrence.pptx
+++ b/reference/presentations/SWPACA-Lawrence.pptx
@@ -202,7 +202,7 @@
           <a:p>
             <a:fld id="{9F8CF2BF-28F6-B244-B3CB-6DB5A9A2E727}" type="datetimeFigureOut">
               <a:rPr lang="en-US" smtClean="0"/>
-              <a:t>15-02-12</a:t>
+              <a:t>15-02-13</a:t>
             </a:fld>
             <a:endParaRPr lang="en-US"/>
           </a:p>
@@ -756,7 +756,7 @@
             <a:fld id="{9D21D778-B565-4D7E-94D7-64010A445B68}" type="datetimeFigureOut">
               <a:rPr lang="en-US" smtClean="0"/>
               <a:pPr eaLnBrk="1" latinLnBrk="0" hangingPunct="1"/>
-              <a:t>15-02-12</a:t>
+              <a:t>15-02-13</a:t>
             </a:fld>
             <a:endParaRPr lang="en-US"/>
           </a:p>
@@ -959,7 +959,7 @@
             <a:fld id="{9D21D778-B565-4D7E-94D7-64010A445B68}" type="datetimeFigureOut">
               <a:rPr lang="en-US" smtClean="0"/>
               <a:pPr eaLnBrk="1" latinLnBrk="0" hangingPunct="1"/>
-              <a:t>15-02-12</a:t>
+              <a:t>15-02-13</a:t>
             </a:fld>
             <a:endParaRPr lang="en-US"/>
           </a:p>
@@ -1137,7 +1137,7 @@
             <a:fld id="{9D21D778-B565-4D7E-94D7-64010A445B68}" type="datetimeFigureOut">
               <a:rPr lang="en-US" smtClean="0"/>
               <a:pPr eaLnBrk="1" latinLnBrk="0" hangingPunct="1"/>
-              <a:t>15-02-12</a:t>
+              <a:t>15-02-13</a:t>
             </a:fld>
             <a:endParaRPr lang="en-US"/>
           </a:p>
@@ -1305,7 +1305,7 @@
             <a:fld id="{9D21D778-B565-4D7E-94D7-64010A445B68}" type="datetimeFigureOut">
               <a:rPr lang="en-US" smtClean="0"/>
               <a:pPr eaLnBrk="1" latinLnBrk="0" hangingPunct="1"/>
-              <a:t>15-02-12</a:t>
+              <a:t>15-02-13</a:t>
             </a:fld>
             <a:endParaRPr lang="en-US"/>
           </a:p>
@@ -1556,7 +1556,7 @@
             <a:fld id="{9D21D778-B565-4D7E-94D7-64010A445B68}" type="datetimeFigureOut">
               <a:rPr lang="en-US" smtClean="0"/>
               <a:pPr eaLnBrk="1" latinLnBrk="0" hangingPunct="1"/>
-              <a:t>15-02-12</a:t>
+              <a:t>15-02-13</a:t>
             </a:fld>
             <a:endParaRPr lang="en-US"/>
           </a:p>
@@ -1883,7 +1883,7 @@
             <a:fld id="{9D21D778-B565-4D7E-94D7-64010A445B68}" type="datetimeFigureOut">
               <a:rPr lang="en-US" smtClean="0"/>
               <a:pPr eaLnBrk="1" latinLnBrk="0" hangingPunct="1"/>
-              <a:t>15-02-12</a:t>
+              <a:t>15-02-13</a:t>
             </a:fld>
             <a:endParaRPr lang="en-US"/>
           </a:p>
@@ -2352,7 +2352,7 @@
             <a:fld id="{9D21D778-B565-4D7E-94D7-64010A445B68}" type="datetimeFigureOut">
               <a:rPr lang="en-US" smtClean="0"/>
               <a:pPr eaLnBrk="1" latinLnBrk="0" hangingPunct="1"/>
-              <a:t>15-02-12</a:t>
+              <a:t>15-02-13</a:t>
             </a:fld>
             <a:endParaRPr lang="en-US"/>
           </a:p>
@@ -2504,7 +2504,7 @@
             <a:fld id="{9D21D778-B565-4D7E-94D7-64010A445B68}" type="datetimeFigureOut">
               <a:rPr lang="en-US" smtClean="0"/>
               <a:pPr eaLnBrk="1" latinLnBrk="0" hangingPunct="1"/>
-              <a:t>15-02-12</a:t>
+              <a:t>15-02-13</a:t>
             </a:fld>
             <a:endParaRPr lang="en-US"/>
           </a:p>
@@ -2597,7 +2597,7 @@
             <a:fld id="{9D21D778-B565-4D7E-94D7-64010A445B68}" type="datetimeFigureOut">
               <a:rPr lang="en-US" smtClean="0"/>
               <a:pPr eaLnBrk="1" latinLnBrk="0" hangingPunct="1"/>
-              <a:t>15-02-12</a:t>
+              <a:t>15-02-13</a:t>
             </a:fld>
             <a:endParaRPr lang="en-US"/>
           </a:p>
@@ -2878,7 +2878,7 @@
             <a:fld id="{9D21D778-B565-4D7E-94D7-64010A445B68}" type="datetimeFigureOut">
               <a:rPr lang="en-US" smtClean="0"/>
               <a:pPr eaLnBrk="1" latinLnBrk="0" hangingPunct="1"/>
-              <a:t>15-02-12</a:t>
+              <a:t>15-02-13</a:t>
             </a:fld>
             <a:endParaRPr lang="en-US"/>
           </a:p>
@@ -3186,7 +3186,7 @@
             <a:fld id="{9D21D778-B565-4D7E-94D7-64010A445B68}" type="datetimeFigureOut">
               <a:rPr lang="en-US" smtClean="0"/>
               <a:pPr eaLnBrk="1" latinLnBrk="0" hangingPunct="1"/>
-              <a:t>15-02-12</a:t>
+              <a:t>15-02-13</a:t>
             </a:fld>
             <a:endParaRPr lang="en-US" dirty="0"/>
           </a:p>
@@ -3487,7 +3487,7 @@
             <a:fld id="{9D21D778-B565-4D7E-94D7-64010A445B68}" type="datetimeFigureOut">
               <a:rPr lang="en-US" smtClean="0"/>
               <a:pPr algn="r" eaLnBrk="1" latinLnBrk="0" hangingPunct="1"/>
-              <a:t>15-02-12</a:t>
+              <a:t>15-02-13</a:t>
             </a:fld>
             <a:endParaRPr lang="en-US" sz="1400" dirty="0">
               <a:solidFill>
@@ -3965,8 +3965,13 @@
             </a:r>
             <a:r>
               <a:rPr lang="en-US" dirty="0"/>
-              <a:t>the Gothic Novel 1790-1930</a:t>
-            </a:r>
+              <a:t>the Gothic Novel 1790-</a:t>
+            </a:r>
+            <a:r>
+              <a:rPr lang="en-US" dirty="0" smtClean="0"/>
+              <a:t>1830</a:t>
+            </a:r>
+            <a:endParaRPr lang="en-US" dirty="0"/>
           </a:p>
           <a:p>
             <a:endParaRPr lang="en-US" dirty="0"/>
@@ -4265,7 +4270,23 @@
             </a:pPr>
             <a:r>
               <a:rPr lang="en-US" dirty="0"/>
-              <a:t>“…and when you have finished Udolpho, we will read the Italian together; and I have made out a list of ten or twelve more of the same kind for you."</a:t>
+              <a:t>“…and when you have finished </a:t>
+            </a:r>
+            <a:r>
+              <a:rPr lang="en-US" i="1" dirty="0"/>
+              <a:t>Udolpho</a:t>
+            </a:r>
+            <a:r>
+              <a:rPr lang="en-US" dirty="0"/>
+              <a:t>, we will read the </a:t>
+            </a:r>
+            <a:r>
+              <a:rPr lang="en-US" i="1" dirty="0"/>
+              <a:t>Italian</a:t>
+            </a:r>
+            <a:r>
+              <a:rPr lang="en-US" dirty="0"/>
+              <a:t> together; and I have made out a list of ten or twelve more of the same kind for you."</a:t>
             </a:r>
           </a:p>
           <a:p>
@@ -4289,15 +4310,67 @@
             </a:pPr>
             <a:r>
               <a:rPr lang="en-US" dirty="0"/>
-              <a:t>"I will read you their names directly; here they are, in my pocketbook. Castle of </a:t>
-            </a:r>
-            <a:r>
-              <a:rPr lang="en-US" dirty="0" err="1"/>
+              <a:t>"I will read you their names directly; here they are, in my pocketbook. </a:t>
+            </a:r>
+            <a:r>
+              <a:rPr lang="en-US" i="1" dirty="0"/>
+              <a:t>Castle of </a:t>
+            </a:r>
+            <a:r>
+              <a:rPr lang="en-US" i="1" dirty="0" err="1"/>
               <a:t>Wolfenbach</a:t>
             </a:r>
             <a:r>
               <a:rPr lang="en-US" dirty="0"/>
-              <a:t>, Clermont, Mysterious Warnings, Necromancer of the Black Forest, Midnight Bell, Orphan of the Rhine, and Horrid Mysteries. Those will last us some time."</a:t>
+              <a:t>, </a:t>
+            </a:r>
+            <a:r>
+              <a:rPr lang="en-US" i="1" dirty="0"/>
+              <a:t>Clermont</a:t>
+            </a:r>
+            <a:r>
+              <a:rPr lang="en-US" dirty="0"/>
+              <a:t>, </a:t>
+            </a:r>
+            <a:r>
+              <a:rPr lang="en-US" i="1" dirty="0"/>
+              <a:t>Mysterious Warnings</a:t>
+            </a:r>
+            <a:r>
+              <a:rPr lang="en-US" dirty="0"/>
+              <a:t>, </a:t>
+            </a:r>
+            <a:r>
+              <a:rPr lang="en-US" i="1" dirty="0"/>
+              <a:t>Necromancer of the Black Forest</a:t>
+            </a:r>
+            <a:r>
+              <a:rPr lang="en-US" dirty="0"/>
+              <a:t>, </a:t>
+            </a:r>
+            <a:r>
+              <a:rPr lang="en-US" i="1" dirty="0"/>
+              <a:t>Midnight Bell</a:t>
+            </a:r>
+            <a:r>
+              <a:rPr lang="en-US" dirty="0"/>
+              <a:t>, </a:t>
+            </a:r>
+            <a:r>
+              <a:rPr lang="en-US" i="1" dirty="0"/>
+              <a:t>Orphan of the Rhine</a:t>
+            </a:r>
+            <a:r>
+              <a:rPr lang="en-US" dirty="0"/>
+              <a:t>, and </a:t>
+            </a:r>
+            <a:r>
+              <a:rPr lang="en-US" i="1" dirty="0"/>
+              <a:t>Horrid Mysteries</a:t>
+            </a:r>
+            <a:r>
+              <a:rPr lang="en-US" dirty="0"/>
+              <a:t>. Those will last us some time."</a:t>
             </a:r>
           </a:p>
           <a:p>

</xml_diff>